<commit_message>
Added code and models for Google Cloud
</commit_message>
<xml_diff>
--- a/UsingYourModels/DL-KCDC.pptx
+++ b/UsingYourModels/DL-KCDC.pptx
@@ -4804,7 +4804,89 @@
                   </a:schemeClr>
                 </a:solidFill>
               </a:rPr>
-              <a:t>Step by step guide</a:t>
+              <a:t>Create Project</a:t>
+            </a:r>
+          </a:p>
+          <a:p>
+            <a:r>
+              <a:rPr lang="en-US" dirty="0">
+                <a:solidFill>
+                  <a:schemeClr val="accent5">
+                    <a:lumMod val="50000"/>
+                  </a:schemeClr>
+                </a:solidFill>
+              </a:rPr>
+              <a:t>Create Cloud Storage Bucket</a:t>
+            </a:r>
+          </a:p>
+          <a:p>
+            <a:pPr lvl="1"/>
+            <a:r>
+              <a:rPr lang="en-US" dirty="0">
+                <a:solidFill>
+                  <a:schemeClr val="accent5">
+                    <a:lumMod val="50000"/>
+                  </a:schemeClr>
+                </a:solidFill>
+              </a:rPr>
+              <a:t>Upload </a:t>
+            </a:r>
+            <a:r>
+              <a:rPr lang="en-US" dirty="0" err="1">
+                <a:solidFill>
+                  <a:schemeClr val="accent5">
+                    <a:lumMod val="50000"/>
+                  </a:schemeClr>
+                </a:solidFill>
+              </a:rPr>
+              <a:t>SavedModel</a:t>
+            </a:r>
+            <a:r>
+              <a:rPr lang="en-US" dirty="0">
+                <a:solidFill>
+                  <a:schemeClr val="accent5">
+                    <a:lumMod val="50000"/>
+                  </a:schemeClr>
+                </a:solidFill>
+              </a:rPr>
+              <a:t> files</a:t>
+            </a:r>
+          </a:p>
+          <a:p>
+            <a:r>
+              <a:rPr lang="en-US" dirty="0">
+                <a:solidFill>
+                  <a:schemeClr val="accent5">
+                    <a:lumMod val="50000"/>
+                  </a:schemeClr>
+                </a:solidFill>
+              </a:rPr>
+              <a:t>Create model in AI Platform </a:t>
+            </a:r>
+          </a:p>
+          <a:p>
+            <a:pPr lvl="1"/>
+            <a:r>
+              <a:rPr lang="en-US" dirty="0">
+                <a:solidFill>
+                  <a:schemeClr val="accent5">
+                    <a:lumMod val="50000"/>
+                  </a:schemeClr>
+                </a:solidFill>
+              </a:rPr>
+              <a:t>This takes a while</a:t>
+            </a:r>
+          </a:p>
+          <a:p>
+            <a:r>
+              <a:rPr lang="en-US" dirty="0">
+                <a:solidFill>
+                  <a:schemeClr val="accent5">
+                    <a:lumMod val="50000"/>
+                  </a:schemeClr>
+                </a:solidFill>
+              </a:rPr>
+              <a:t>Test &amp; Use</a:t>
             </a:r>
           </a:p>
           <a:p>
@@ -4816,8 +4898,56 @@
               </a:solidFill>
             </a:endParaRPr>
           </a:p>
-        </p:txBody>
-      </p:sp>
+          <a:p>
+            <a:endParaRPr lang="en-US" dirty="0">
+              <a:solidFill>
+                <a:schemeClr val="accent5">
+                  <a:lumMod val="50000"/>
+                </a:schemeClr>
+              </a:solidFill>
+            </a:endParaRPr>
+          </a:p>
+          <a:p>
+            <a:endParaRPr lang="en-US" dirty="0">
+              <a:solidFill>
+                <a:schemeClr val="accent5">
+                  <a:lumMod val="50000"/>
+                </a:schemeClr>
+              </a:solidFill>
+            </a:endParaRPr>
+          </a:p>
+        </p:txBody>
+      </p:sp>
+      <p:pic>
+        <p:nvPicPr>
+          <p:cNvPr id="5" name="Picture 4">
+            <a:extLst>
+              <a:ext uri="{FF2B5EF4-FFF2-40B4-BE49-F238E27FC236}">
+                <a16:creationId xmlns:a16="http://schemas.microsoft.com/office/drawing/2014/main" id="{4D3F7ECC-1726-8156-3A4A-40A6C36ADE88}"/>
+              </a:ext>
+            </a:extLst>
+          </p:cNvPr>
+          <p:cNvPicPr>
+            <a:picLocks noChangeAspect="1"/>
+          </p:cNvPicPr>
+          <p:nvPr/>
+        </p:nvPicPr>
+        <p:blipFill>
+          <a:blip r:embed="rId2"/>
+          <a:stretch>
+            <a:fillRect/>
+          </a:stretch>
+        </p:blipFill>
+        <p:spPr>
+          <a:xfrm>
+            <a:off x="5905500" y="1353344"/>
+            <a:ext cx="6286500" cy="5295900"/>
+          </a:xfrm>
+          <a:prstGeom prst="rect">
+            <a:avLst/>
+          </a:prstGeom>
+        </p:spPr>
+      </p:pic>
     </p:spTree>
     <p:extLst>
       <p:ext uri="{BB962C8B-B14F-4D97-AF65-F5344CB8AC3E}">

</xml_diff>